<commit_message>
Update PowerPoint add PDF for 08/26
</commit_message>
<xml_diff>
--- a/Slides/082625-MChowdhury.pptx
+++ b/Slides/082625-MChowdhury.pptx
@@ -5,7 +5,7 @@
     <p:sldMasterId id="2147483648" r:id="rId1"/>
   </p:sldMasterIdLst>
   <p:notesMasterIdLst>
-    <p:notesMasterId r:id="rId48"/>
+    <p:notesMasterId r:id="rId47"/>
   </p:notesMasterIdLst>
   <p:sldIdLst>
     <p:sldId id="256" r:id="rId2"/>
@@ -53,7 +53,6 @@
     <p:sldId id="304" r:id="rId44"/>
     <p:sldId id="305" r:id="rId45"/>
     <p:sldId id="313" r:id="rId46"/>
-    <p:sldId id="329" r:id="rId47"/>
   </p:sldIdLst>
   <p:sldSz cx="12192000" cy="6858000"/>
   <p:notesSz cx="6858000" cy="9144000"/>
@@ -3986,7 +3985,7 @@
           <a:p>
             <a:fld id="{7B04D10A-81D1-8748-8404-C44E2799F913}" type="datetimeFigureOut">
               <a:rPr lang="en-US" smtClean="0"/>
-              <a:t>8/25/25</a:t>
+              <a:t>8/26/25</a:t>
             </a:fld>
             <a:endParaRPr lang="en-US"/>
           </a:p>
@@ -24080,171 +24079,6 @@
 </p:sld>
 </file>
 
-<file path=ppt/slides/slide46.xml><?xml version="1.0" encoding="utf-8"?>
-<p:sld xmlns:a="http://schemas.openxmlformats.org/drawingml/2006/main" xmlns:r="http://schemas.openxmlformats.org/officeDocument/2006/relationships" xmlns:p="http://schemas.openxmlformats.org/presentationml/2006/main">
-  <p:cSld>
-    <p:spTree>
-      <p:nvGrpSpPr>
-        <p:cNvPr id="1" name=""/>
-        <p:cNvGrpSpPr/>
-        <p:nvPr/>
-      </p:nvGrpSpPr>
-      <p:grpSpPr>
-        <a:xfrm>
-          <a:off x="0" y="0"/>
-          <a:ext cx="0" cy="0"/>
-          <a:chOff x="0" y="0"/>
-          <a:chExt cx="0" cy="0"/>
-        </a:xfrm>
-      </p:grpSpPr>
-      <p:sp>
-        <p:nvSpPr>
-          <p:cNvPr id="2" name="Title 1">
-            <a:extLst>
-              <a:ext uri="{FF2B5EF4-FFF2-40B4-BE49-F238E27FC236}">
-                <a16:creationId xmlns:a16="http://schemas.microsoft.com/office/drawing/2014/main" id="{761A5EE0-39DD-2E44-B957-8EE4ADE66A8B}"/>
-              </a:ext>
-            </a:extLst>
-          </p:cNvPr>
-          <p:cNvSpPr>
-            <a:spLocks noGrp="1"/>
-          </p:cNvSpPr>
-          <p:nvPr>
-            <p:ph type="title"/>
-          </p:nvPr>
-        </p:nvSpPr>
-        <p:spPr/>
-        <p:txBody>
-          <a:bodyPr/>
-          <a:lstStyle/>
-          <a:p>
-            <a:endParaRPr lang="en-US"/>
-          </a:p>
-        </p:txBody>
-      </p:sp>
-      <p:sp>
-        <p:nvSpPr>
-          <p:cNvPr id="3" name="Content Placeholder 2">
-            <a:extLst>
-              <a:ext uri="{FF2B5EF4-FFF2-40B4-BE49-F238E27FC236}">
-                <a16:creationId xmlns:a16="http://schemas.microsoft.com/office/drawing/2014/main" id="{77CE0D8C-B8EC-1846-8340-2BCF68DC9E17}"/>
-              </a:ext>
-            </a:extLst>
-          </p:cNvPr>
-          <p:cNvSpPr>
-            <a:spLocks noGrp="1"/>
-          </p:cNvSpPr>
-          <p:nvPr>
-            <p:ph idx="1"/>
-          </p:nvPr>
-        </p:nvSpPr>
-        <p:spPr/>
-        <p:txBody>
-          <a:bodyPr/>
-          <a:lstStyle/>
-          <a:p>
-            <a:endParaRPr lang="en-US"/>
-          </a:p>
-        </p:txBody>
-      </p:sp>
-      <p:sp>
-        <p:nvSpPr>
-          <p:cNvPr id="4" name="Date Placeholder 3">
-            <a:extLst>
-              <a:ext uri="{FF2B5EF4-FFF2-40B4-BE49-F238E27FC236}">
-                <a16:creationId xmlns:a16="http://schemas.microsoft.com/office/drawing/2014/main" id="{41F3EDE6-BF1C-A941-8B72-E23B82634EC3}"/>
-              </a:ext>
-            </a:extLst>
-          </p:cNvPr>
-          <p:cNvSpPr>
-            <a:spLocks noGrp="1"/>
-          </p:cNvSpPr>
-          <p:nvPr>
-            <p:ph type="dt" sz="half" idx="10"/>
-          </p:nvPr>
-        </p:nvSpPr>
-        <p:spPr/>
-        <p:txBody>
-          <a:bodyPr/>
-          <a:lstStyle/>
-          <a:p>
-            <a:r>
-              <a:rPr lang="en-US"/>
-              <a:t>8/26/25</a:t>
-            </a:r>
-          </a:p>
-        </p:txBody>
-      </p:sp>
-      <p:sp>
-        <p:nvSpPr>
-          <p:cNvPr id="5" name="Footer Placeholder 4">
-            <a:extLst>
-              <a:ext uri="{FF2B5EF4-FFF2-40B4-BE49-F238E27FC236}">
-                <a16:creationId xmlns:a16="http://schemas.microsoft.com/office/drawing/2014/main" id="{F96EB47B-6155-0B48-B45B-977512E9B4AD}"/>
-              </a:ext>
-            </a:extLst>
-          </p:cNvPr>
-          <p:cNvSpPr>
-            <a:spLocks noGrp="1"/>
-          </p:cNvSpPr>
-          <p:nvPr>
-            <p:ph type="ftr" sz="quarter" idx="11"/>
-          </p:nvPr>
-        </p:nvSpPr>
-        <p:spPr/>
-        <p:txBody>
-          <a:bodyPr/>
-          <a:lstStyle/>
-          <a:p>
-            <a:r>
-              <a:rPr lang="en-US"/>
-              <a:t>CSE 598 – F25</a:t>
-            </a:r>
-          </a:p>
-        </p:txBody>
-      </p:sp>
-      <p:sp>
-        <p:nvSpPr>
-          <p:cNvPr id="6" name="Slide Number Placeholder 5">
-            <a:extLst>
-              <a:ext uri="{FF2B5EF4-FFF2-40B4-BE49-F238E27FC236}">
-                <a16:creationId xmlns:a16="http://schemas.microsoft.com/office/drawing/2014/main" id="{C966827F-6521-544E-98A7-50F56B9A59B1}"/>
-              </a:ext>
-            </a:extLst>
-          </p:cNvPr>
-          <p:cNvSpPr>
-            <a:spLocks noGrp="1"/>
-          </p:cNvSpPr>
-          <p:nvPr>
-            <p:ph type="sldNum" sz="quarter" idx="12"/>
-          </p:nvPr>
-        </p:nvSpPr>
-        <p:spPr/>
-        <p:txBody>
-          <a:bodyPr/>
-          <a:lstStyle/>
-          <a:p>
-            <a:fld id="{4EEF9975-6C58-5C4C-8961-54FFA2646BAA}" type="slidenum">
-              <a:rPr lang="en-US" smtClean="0"/>
-              <a:t>46</a:t>
-            </a:fld>
-            <a:endParaRPr lang="en-US"/>
-          </a:p>
-        </p:txBody>
-      </p:sp>
-    </p:spTree>
-    <p:extLst>
-      <p:ext uri="{BB962C8B-B14F-4D97-AF65-F5344CB8AC3E}">
-        <p14:creationId xmlns:p14="http://schemas.microsoft.com/office/powerpoint/2010/main" val="3032145855"/>
-      </p:ext>
-    </p:extLst>
-  </p:cSld>
-  <p:clrMapOvr>
-    <a:masterClrMapping/>
-  </p:clrMapOvr>
-</p:sld>
-</file>
-
 <file path=ppt/slides/slide5.xml><?xml version="1.0" encoding="utf-8"?>
 <p:sld xmlns:a="http://schemas.openxmlformats.org/drawingml/2006/main" xmlns:r="http://schemas.openxmlformats.org/officeDocument/2006/relationships" xmlns:p="http://schemas.openxmlformats.org/presentationml/2006/main">
   <p:cSld>

</xml_diff>

<commit_message>
Fix typos in slide and add link in README
</commit_message>
<xml_diff>
--- a/Slides/082625-MChowdhury.pptx
+++ b/Slides/082625-MChowdhury.pptx
@@ -8057,13 +8057,6 @@
             </a:r>
           </a:p>
           <a:p>
-            <a:pPr lvl="2"/>
-            <a:r>
-              <a:rPr lang="en-US" b="1" dirty="0"/>
-              <a:t>We need a group to pickup duties for Sep 4!!!</a:t>
-            </a:r>
-          </a:p>
-          <a:p>
             <a:pPr lvl="1"/>
             <a:r>
               <a:rPr lang="en-US" dirty="0"/>
@@ -8073,18 +8066,18 @@
               <a:rPr lang="en-US" dirty="0">
                 <a:hlinkClick r:id="rId3"/>
               </a:rPr>
-              <a:t>Ed </a:t>
+              <a:t>Ed</a:t>
             </a:r>
             <a:r>
               <a:rPr lang="en-US" dirty="0"/>
-              <a:t>to find group members</a:t>
+              <a:t> to find group members</a:t>
             </a:r>
           </a:p>
           <a:p>
             <a:pPr lvl="1"/>
             <a:r>
               <a:rPr lang="en-US" dirty="0"/>
-              <a:t>Group size should be 4</a:t>
+              <a:t>Group size should be 3-4</a:t>
             </a:r>
           </a:p>
         </p:txBody>
@@ -8613,7 +8606,7 @@
             <a:pPr lvl="1"/>
             <a:r>
               <a:rPr lang="en-US" dirty="0"/>
-              <a:t>Use Google Sheets so we can provide in-place comments/feedback</a:t>
+              <a:t>Use Google Slides so we can provide in-place comments/feedback</a:t>
             </a:r>
           </a:p>
           <a:p>

</xml_diff>